<commit_message>
Alteracao do dia 01/04/2024
</commit_message>
<xml_diff>
--- a/Aulas/04 - Criação de Tabela com Controles/04 - Tabela com Controles.pptx
+++ b/Aulas/04 - Criação de Tabela com Controles/04 - Tabela com Controles.pptx
@@ -34,6 +34,7 @@
     <p:sldId id="282" r:id="rId28"/>
     <p:sldId id="283" r:id="rId29"/>
     <p:sldId id="284" r:id="rId30"/>
+    <p:sldId id="285" r:id="rId31"/>
   </p:sldIdLst>
   <p:sldSz cx="12192000" cy="6858000"/>
   <p:notesSz cx="6858000" cy="9144000"/>
@@ -18111,25 +18112,7 @@
                 <a:latin typeface="Courier New" panose="02070309020205020404" pitchFamily="49" charset="0"/>
                 <a:cs typeface="Courier New" panose="02070309020205020404" pitchFamily="49" charset="0"/>
               </a:rPr>
-              <a:t>// manipulador de eventos para clique duplo</a:t>
-            </a:r>
-          </a:p>
-          <a:p>
-            <a:pPr marL="0" lvl="0" indent="0">
-              <a:lnSpc>
-                <a:spcPct val="100000"/>
-              </a:lnSpc>
-              <a:spcBef>
-                <a:spcPts val="0"/>
-              </a:spcBef>
-              <a:buNone/>
-            </a:pPr>
-            <a:r>
-              <a:rPr lang="pt-BR" sz="1200" b="1" dirty="0">
-                <a:latin typeface="Courier New" panose="02070309020205020404" pitchFamily="49" charset="0"/>
-                <a:cs typeface="Courier New" panose="02070309020205020404" pitchFamily="49" charset="0"/>
-              </a:rPr>
-              <a:t>// </a:t>
+              <a:t>// criar manipulador de eventos para clique duplo</a:t>
             </a:r>
           </a:p>
           <a:p>
@@ -21127,7 +21110,7 @@
                 <a:latin typeface="Courier New" panose="02070309020205020404" pitchFamily="49" charset="0"/>
                 <a:cs typeface="Courier New" panose="02070309020205020404" pitchFamily="49" charset="0"/>
               </a:rPr>
-              <a:t>// alterar o método </a:t>
+              <a:t>// criar o método </a:t>
             </a:r>
             <a:r>
               <a:rPr lang="pt-BR" sz="1200" b="1" dirty="0" err="1">
@@ -23400,6 +23383,630 @@
     <p:extLst>
       <p:ext uri="{BB962C8B-B14F-4D97-AF65-F5344CB8AC3E}">
         <p14:creationId xmlns:p14="http://schemas.microsoft.com/office/powerpoint/2010/main" val="2525430843"/>
+      </p:ext>
+    </p:extLst>
+  </p:cSld>
+  <p:clrMapOvr>
+    <a:masterClrMapping/>
+  </p:clrMapOvr>
+</p:sld>
+</file>
+
+<file path=ppt/slides/slide30.xml><?xml version="1.0" encoding="utf-8"?>
+<p:sld xmlns:a="http://schemas.openxmlformats.org/drawingml/2006/main" xmlns:r="http://schemas.openxmlformats.org/officeDocument/2006/relationships" xmlns:p="http://schemas.openxmlformats.org/presentationml/2006/main">
+  <p:cSld>
+    <p:spTree>
+      <p:nvGrpSpPr>
+        <p:cNvPr id="1" name=""/>
+        <p:cNvGrpSpPr/>
+        <p:nvPr/>
+      </p:nvGrpSpPr>
+      <p:grpSpPr>
+        <a:xfrm>
+          <a:off x="0" y="0"/>
+          <a:ext cx="0" cy="0"/>
+          <a:chOff x="0" y="0"/>
+          <a:chExt cx="0" cy="0"/>
+        </a:xfrm>
+      </p:grpSpPr>
+      <p:sp>
+        <p:nvSpPr>
+          <p:cNvPr id="2" name="Título 1">
+            <a:extLst>
+              <a:ext uri="{FF2B5EF4-FFF2-40B4-BE49-F238E27FC236}">
+                <a16:creationId xmlns:a16="http://schemas.microsoft.com/office/drawing/2014/main" id="{AE3EA2E6-2E1F-4910-80F5-FEA8176D6347}"/>
+              </a:ext>
+            </a:extLst>
+          </p:cNvPr>
+          <p:cNvSpPr>
+            <a:spLocks noGrp="1"/>
+          </p:cNvSpPr>
+          <p:nvPr>
+            <p:ph type="title"/>
+          </p:nvPr>
+        </p:nvSpPr>
+        <p:spPr/>
+        <p:txBody>
+          <a:bodyPr/>
+          <a:lstStyle/>
+          <a:p>
+            <a:pPr algn="r"/>
+            <a:r>
+              <a:rPr lang="pt-BR" dirty="0">
+                <a:solidFill>
+                  <a:prstClr val="black"/>
+                </a:solidFill>
+              </a:rPr>
+              <a:t>Criação da Tabela</a:t>
+            </a:r>
+            <a:br>
+              <a:rPr lang="pt-BR" dirty="0">
+                <a:solidFill>
+                  <a:prstClr val="black"/>
+                </a:solidFill>
+              </a:rPr>
+            </a:br>
+            <a:r>
+              <a:rPr lang="pt-BR" sz="2400" dirty="0">
+                <a:solidFill>
+                  <a:prstClr val="black"/>
+                </a:solidFill>
+              </a:rPr>
+              <a:t>(Edição de Célula)</a:t>
+            </a:r>
+            <a:endParaRPr lang="pt-BR" dirty="0"/>
+          </a:p>
+        </p:txBody>
+      </p:sp>
+      <p:sp>
+        <p:nvSpPr>
+          <p:cNvPr id="3" name="Espaço Reservado para Conteúdo 2">
+            <a:extLst>
+              <a:ext uri="{FF2B5EF4-FFF2-40B4-BE49-F238E27FC236}">
+                <a16:creationId xmlns:a16="http://schemas.microsoft.com/office/drawing/2014/main" id="{76A075FF-5552-4825-A833-DC93985E762E}"/>
+              </a:ext>
+            </a:extLst>
+          </p:cNvPr>
+          <p:cNvSpPr>
+            <a:spLocks noGrp="1"/>
+          </p:cNvSpPr>
+          <p:nvPr>
+            <p:ph idx="1"/>
+          </p:nvPr>
+        </p:nvSpPr>
+        <p:spPr/>
+        <p:txBody>
+          <a:bodyPr>
+            <a:normAutofit/>
+          </a:bodyPr>
+          <a:lstStyle/>
+          <a:p>
+            <a:pPr marL="0" lvl="0" indent="0">
+              <a:lnSpc>
+                <a:spcPct val="100000"/>
+              </a:lnSpc>
+              <a:spcBef>
+                <a:spcPts val="0"/>
+              </a:spcBef>
+              <a:buNone/>
+            </a:pPr>
+            <a:r>
+              <a:rPr lang="pt-BR" sz="1200" b="1" dirty="0">
+                <a:latin typeface="Courier New" panose="02070309020205020404" pitchFamily="49" charset="0"/>
+                <a:cs typeface="Courier New" panose="02070309020205020404" pitchFamily="49" charset="0"/>
+              </a:rPr>
+              <a:t>// alterar o construtor</a:t>
+            </a:r>
+          </a:p>
+          <a:p>
+            <a:pPr marL="0" lvl="0" indent="0">
+              <a:lnSpc>
+                <a:spcPct val="100000"/>
+              </a:lnSpc>
+              <a:spcBef>
+                <a:spcPts val="0"/>
+              </a:spcBef>
+              <a:buNone/>
+            </a:pPr>
+            <a:r>
+              <a:rPr lang="pt-BR" sz="1200" b="1" dirty="0">
+                <a:latin typeface="Courier New" panose="02070309020205020404" pitchFamily="49" charset="0"/>
+                <a:cs typeface="Courier New" panose="02070309020205020404" pitchFamily="49" charset="0"/>
+              </a:rPr>
+              <a:t>//</a:t>
+            </a:r>
+          </a:p>
+          <a:p>
+            <a:pPr marL="0" indent="0">
+              <a:buNone/>
+            </a:pPr>
+            <a:r>
+              <a:rPr lang="pt-BR" sz="1200" dirty="0">
+                <a:solidFill>
+                  <a:srgbClr val="CCCCCC"/>
+                </a:solidFill>
+                <a:latin typeface="Consolas" panose="020B0609020204030204" pitchFamily="49" charset="0"/>
+              </a:rPr>
+              <a:t>        </a:t>
+            </a:r>
+            <a:r>
+              <a:rPr lang="pt-BR" sz="1200" dirty="0" err="1">
+                <a:solidFill>
+                  <a:srgbClr val="569CD6"/>
+                </a:solidFill>
+                <a:latin typeface="Consolas" panose="020B0609020204030204" pitchFamily="49" charset="0"/>
+              </a:rPr>
+              <a:t>this</a:t>
+            </a:r>
+            <a:r>
+              <a:rPr lang="pt-BR" sz="1200" dirty="0" err="1">
+                <a:solidFill>
+                  <a:srgbClr val="CCCCCC"/>
+                </a:solidFill>
+                <a:latin typeface="Consolas" panose="020B0609020204030204" pitchFamily="49" charset="0"/>
+              </a:rPr>
+              <a:t>.</a:t>
+            </a:r>
+            <a:r>
+              <a:rPr lang="pt-BR" sz="1200" dirty="0" err="1">
+                <a:solidFill>
+                  <a:srgbClr val="DCDCAA"/>
+                </a:solidFill>
+                <a:latin typeface="Consolas" panose="020B0609020204030204" pitchFamily="49" charset="0"/>
+              </a:rPr>
+              <a:t>onClick</a:t>
+            </a:r>
+            <a:r>
+              <a:rPr lang="pt-BR" sz="1200" dirty="0">
+                <a:solidFill>
+                  <a:srgbClr val="CCCCCC"/>
+                </a:solidFill>
+                <a:latin typeface="Consolas" panose="020B0609020204030204" pitchFamily="49" charset="0"/>
+              </a:rPr>
+              <a:t> </a:t>
+            </a:r>
+            <a:r>
+              <a:rPr lang="pt-BR" sz="1200" dirty="0">
+                <a:solidFill>
+                  <a:srgbClr val="D4D4D4"/>
+                </a:solidFill>
+                <a:latin typeface="Consolas" panose="020B0609020204030204" pitchFamily="49" charset="0"/>
+              </a:rPr>
+              <a:t>=</a:t>
+            </a:r>
+            <a:r>
+              <a:rPr lang="pt-BR" sz="1200" dirty="0">
+                <a:solidFill>
+                  <a:srgbClr val="CCCCCC"/>
+                </a:solidFill>
+                <a:latin typeface="Consolas" panose="020B0609020204030204" pitchFamily="49" charset="0"/>
+              </a:rPr>
+              <a:t> </a:t>
+            </a:r>
+            <a:r>
+              <a:rPr lang="pt-BR" sz="1200" dirty="0" err="1">
+                <a:solidFill>
+                  <a:srgbClr val="569CD6"/>
+                </a:solidFill>
+                <a:latin typeface="Consolas" panose="020B0609020204030204" pitchFamily="49" charset="0"/>
+              </a:rPr>
+              <a:t>this</a:t>
+            </a:r>
+            <a:r>
+              <a:rPr lang="pt-BR" sz="1200" dirty="0" err="1">
+                <a:solidFill>
+                  <a:srgbClr val="CCCCCC"/>
+                </a:solidFill>
+                <a:latin typeface="Consolas" panose="020B0609020204030204" pitchFamily="49" charset="0"/>
+              </a:rPr>
+              <a:t>.</a:t>
+            </a:r>
+            <a:r>
+              <a:rPr lang="pt-BR" sz="1200" dirty="0" err="1">
+                <a:solidFill>
+                  <a:srgbClr val="DCDCAA"/>
+                </a:solidFill>
+                <a:latin typeface="Consolas" panose="020B0609020204030204" pitchFamily="49" charset="0"/>
+              </a:rPr>
+              <a:t>onClick</a:t>
+            </a:r>
+            <a:r>
+              <a:rPr lang="pt-BR" sz="1200" dirty="0" err="1">
+                <a:solidFill>
+                  <a:srgbClr val="CCCCCC"/>
+                </a:solidFill>
+                <a:latin typeface="Consolas" panose="020B0609020204030204" pitchFamily="49" charset="0"/>
+              </a:rPr>
+              <a:t>.</a:t>
+            </a:r>
+            <a:r>
+              <a:rPr lang="pt-BR" sz="1200" dirty="0" err="1">
+                <a:solidFill>
+                  <a:srgbClr val="DCDCAA"/>
+                </a:solidFill>
+                <a:latin typeface="Consolas" panose="020B0609020204030204" pitchFamily="49" charset="0"/>
+              </a:rPr>
+              <a:t>bind</a:t>
+            </a:r>
+            <a:r>
+              <a:rPr lang="pt-BR" sz="1200" dirty="0">
+                <a:solidFill>
+                  <a:srgbClr val="CCCCCC"/>
+                </a:solidFill>
+                <a:latin typeface="Consolas" panose="020B0609020204030204" pitchFamily="49" charset="0"/>
+              </a:rPr>
+              <a:t>(</a:t>
+            </a:r>
+            <a:r>
+              <a:rPr lang="pt-BR" sz="1200" dirty="0" err="1">
+                <a:solidFill>
+                  <a:srgbClr val="569CD6"/>
+                </a:solidFill>
+                <a:latin typeface="Consolas" panose="020B0609020204030204" pitchFamily="49" charset="0"/>
+              </a:rPr>
+              <a:t>this</a:t>
+            </a:r>
+            <a:r>
+              <a:rPr lang="pt-BR" sz="1200" dirty="0">
+                <a:solidFill>
+                  <a:srgbClr val="CCCCCC"/>
+                </a:solidFill>
+                <a:latin typeface="Consolas" panose="020B0609020204030204" pitchFamily="49" charset="0"/>
+              </a:rPr>
+              <a:t>);</a:t>
+            </a:r>
+          </a:p>
+          <a:p>
+            <a:pPr marL="0" indent="0">
+              <a:buNone/>
+            </a:pPr>
+            <a:r>
+              <a:rPr lang="pt-BR" sz="1200" dirty="0">
+                <a:solidFill>
+                  <a:srgbClr val="CCCCCC"/>
+                </a:solidFill>
+                <a:latin typeface="Consolas" panose="020B0609020204030204" pitchFamily="49" charset="0"/>
+              </a:rPr>
+              <a:t>        </a:t>
+            </a:r>
+            <a:r>
+              <a:rPr lang="pt-BR" sz="1200" dirty="0" err="1">
+                <a:solidFill>
+                  <a:srgbClr val="569CD6"/>
+                </a:solidFill>
+                <a:latin typeface="Consolas" panose="020B0609020204030204" pitchFamily="49" charset="0"/>
+              </a:rPr>
+              <a:t>this</a:t>
+            </a:r>
+            <a:r>
+              <a:rPr lang="pt-BR" sz="1200" dirty="0" err="1">
+                <a:solidFill>
+                  <a:srgbClr val="CCCCCC"/>
+                </a:solidFill>
+                <a:latin typeface="Consolas" panose="020B0609020204030204" pitchFamily="49" charset="0"/>
+              </a:rPr>
+              <a:t>.</a:t>
+            </a:r>
+            <a:r>
+              <a:rPr lang="pt-BR" sz="1200" dirty="0" err="1">
+                <a:solidFill>
+                  <a:srgbClr val="DCDCAA"/>
+                </a:solidFill>
+                <a:latin typeface="Consolas" panose="020B0609020204030204" pitchFamily="49" charset="0"/>
+              </a:rPr>
+              <a:t>onDoubleClick</a:t>
+            </a:r>
+            <a:r>
+              <a:rPr lang="pt-BR" sz="1200" dirty="0">
+                <a:solidFill>
+                  <a:srgbClr val="CCCCCC"/>
+                </a:solidFill>
+                <a:latin typeface="Consolas" panose="020B0609020204030204" pitchFamily="49" charset="0"/>
+              </a:rPr>
+              <a:t> </a:t>
+            </a:r>
+            <a:r>
+              <a:rPr lang="pt-BR" sz="1200" dirty="0">
+                <a:solidFill>
+                  <a:srgbClr val="D4D4D4"/>
+                </a:solidFill>
+                <a:latin typeface="Consolas" panose="020B0609020204030204" pitchFamily="49" charset="0"/>
+              </a:rPr>
+              <a:t>=</a:t>
+            </a:r>
+            <a:r>
+              <a:rPr lang="pt-BR" sz="1200" dirty="0">
+                <a:solidFill>
+                  <a:srgbClr val="CCCCCC"/>
+                </a:solidFill>
+                <a:latin typeface="Consolas" panose="020B0609020204030204" pitchFamily="49" charset="0"/>
+              </a:rPr>
+              <a:t> </a:t>
+            </a:r>
+            <a:r>
+              <a:rPr lang="pt-BR" sz="1200" dirty="0" err="1">
+                <a:solidFill>
+                  <a:srgbClr val="569CD6"/>
+                </a:solidFill>
+                <a:latin typeface="Consolas" panose="020B0609020204030204" pitchFamily="49" charset="0"/>
+              </a:rPr>
+              <a:t>this</a:t>
+            </a:r>
+            <a:r>
+              <a:rPr lang="pt-BR" sz="1200" dirty="0" err="1">
+                <a:solidFill>
+                  <a:srgbClr val="CCCCCC"/>
+                </a:solidFill>
+                <a:latin typeface="Consolas" panose="020B0609020204030204" pitchFamily="49" charset="0"/>
+              </a:rPr>
+              <a:t>.</a:t>
+            </a:r>
+            <a:r>
+              <a:rPr lang="pt-BR" sz="1200" dirty="0" err="1">
+                <a:solidFill>
+                  <a:srgbClr val="DCDCAA"/>
+                </a:solidFill>
+                <a:latin typeface="Consolas" panose="020B0609020204030204" pitchFamily="49" charset="0"/>
+              </a:rPr>
+              <a:t>onDoubleClick</a:t>
+            </a:r>
+            <a:r>
+              <a:rPr lang="pt-BR" sz="1200" dirty="0" err="1">
+                <a:solidFill>
+                  <a:srgbClr val="CCCCCC"/>
+                </a:solidFill>
+                <a:latin typeface="Consolas" panose="020B0609020204030204" pitchFamily="49" charset="0"/>
+              </a:rPr>
+              <a:t>.</a:t>
+            </a:r>
+            <a:r>
+              <a:rPr lang="pt-BR" sz="1200" dirty="0" err="1">
+                <a:solidFill>
+                  <a:srgbClr val="DCDCAA"/>
+                </a:solidFill>
+                <a:latin typeface="Consolas" panose="020B0609020204030204" pitchFamily="49" charset="0"/>
+              </a:rPr>
+              <a:t>bind</a:t>
+            </a:r>
+            <a:r>
+              <a:rPr lang="pt-BR" sz="1200" dirty="0">
+                <a:solidFill>
+                  <a:srgbClr val="CCCCCC"/>
+                </a:solidFill>
+                <a:latin typeface="Consolas" panose="020B0609020204030204" pitchFamily="49" charset="0"/>
+              </a:rPr>
+              <a:t>(</a:t>
+            </a:r>
+            <a:r>
+              <a:rPr lang="pt-BR" sz="1200" dirty="0" err="1">
+                <a:solidFill>
+                  <a:srgbClr val="569CD6"/>
+                </a:solidFill>
+                <a:latin typeface="Consolas" panose="020B0609020204030204" pitchFamily="49" charset="0"/>
+              </a:rPr>
+              <a:t>this</a:t>
+            </a:r>
+            <a:r>
+              <a:rPr lang="pt-BR" sz="1200" dirty="0">
+                <a:solidFill>
+                  <a:srgbClr val="CCCCCC"/>
+                </a:solidFill>
+                <a:latin typeface="Consolas" panose="020B0609020204030204" pitchFamily="49" charset="0"/>
+              </a:rPr>
+              <a:t>);</a:t>
+            </a:r>
+          </a:p>
+          <a:p>
+            <a:pPr marL="0" indent="0">
+              <a:buNone/>
+            </a:pPr>
+            <a:r>
+              <a:rPr lang="pt-BR" sz="1200" b="1" dirty="0">
+                <a:solidFill>
+                  <a:srgbClr val="FF0000"/>
+                </a:solidFill>
+                <a:latin typeface="Consolas" panose="020B0609020204030204" pitchFamily="49" charset="0"/>
+              </a:rPr>
+              <a:t>        </a:t>
+            </a:r>
+            <a:r>
+              <a:rPr lang="pt-BR" sz="1200" b="1" dirty="0" err="1">
+                <a:solidFill>
+                  <a:srgbClr val="FF0000"/>
+                </a:solidFill>
+                <a:latin typeface="Consolas" panose="020B0609020204030204" pitchFamily="49" charset="0"/>
+              </a:rPr>
+              <a:t>this</a:t>
+            </a:r>
+            <a:r>
+              <a:rPr lang="pt-BR" sz="1200" b="1" dirty="0">
+                <a:solidFill>
+                  <a:srgbClr val="FF0000"/>
+                </a:solidFill>
+                <a:latin typeface="Consolas" panose="020B0609020204030204" pitchFamily="49" charset="0"/>
+              </a:rPr>
+              <a:t>. </a:t>
+            </a:r>
+            <a:r>
+              <a:rPr lang="pt-BR" sz="1200" b="1" dirty="0" err="1">
+                <a:solidFill>
+                  <a:srgbClr val="FF0000"/>
+                </a:solidFill>
+                <a:latin typeface="Consolas" panose="020B0609020204030204" pitchFamily="49" charset="0"/>
+              </a:rPr>
+              <a:t>onSaveEdit</a:t>
+            </a:r>
+            <a:r>
+              <a:rPr lang="pt-BR" sz="1200" b="1" dirty="0">
+                <a:solidFill>
+                  <a:srgbClr val="FF0000"/>
+                </a:solidFill>
+                <a:latin typeface="Consolas" panose="020B0609020204030204" pitchFamily="49" charset="0"/>
+              </a:rPr>
+              <a:t> = </a:t>
+            </a:r>
+            <a:r>
+              <a:rPr lang="pt-BR" sz="1200" b="1" dirty="0" err="1">
+                <a:solidFill>
+                  <a:srgbClr val="FF0000"/>
+                </a:solidFill>
+                <a:latin typeface="Consolas" panose="020B0609020204030204" pitchFamily="49" charset="0"/>
+              </a:rPr>
+              <a:t>this</a:t>
+            </a:r>
+            <a:r>
+              <a:rPr lang="pt-BR" sz="1200" b="1" dirty="0">
+                <a:solidFill>
+                  <a:srgbClr val="FF0000"/>
+                </a:solidFill>
+                <a:latin typeface="Consolas" panose="020B0609020204030204" pitchFamily="49" charset="0"/>
+              </a:rPr>
+              <a:t>. </a:t>
+            </a:r>
+            <a:r>
+              <a:rPr lang="pt-BR" sz="1200" b="1" dirty="0" err="1">
+                <a:solidFill>
+                  <a:srgbClr val="FF0000"/>
+                </a:solidFill>
+                <a:latin typeface="Consolas" panose="020B0609020204030204" pitchFamily="49" charset="0"/>
+              </a:rPr>
+              <a:t>onSaveEdit.bind</a:t>
+            </a:r>
+            <a:r>
+              <a:rPr lang="pt-BR" sz="1200" b="1" dirty="0">
+                <a:solidFill>
+                  <a:srgbClr val="FF0000"/>
+                </a:solidFill>
+                <a:latin typeface="Consolas" panose="020B0609020204030204" pitchFamily="49" charset="0"/>
+              </a:rPr>
+              <a:t>(</a:t>
+            </a:r>
+            <a:r>
+              <a:rPr lang="pt-BR" sz="1200" b="1" dirty="0" err="1">
+                <a:solidFill>
+                  <a:srgbClr val="FF0000"/>
+                </a:solidFill>
+                <a:latin typeface="Consolas" panose="020B0609020204030204" pitchFamily="49" charset="0"/>
+              </a:rPr>
+              <a:t>this</a:t>
+            </a:r>
+            <a:r>
+              <a:rPr lang="pt-BR" sz="1200" b="1" dirty="0">
+                <a:solidFill>
+                  <a:srgbClr val="FF0000"/>
+                </a:solidFill>
+                <a:latin typeface="Consolas" panose="020B0609020204030204" pitchFamily="49" charset="0"/>
+              </a:rPr>
+              <a:t>);</a:t>
+            </a:r>
+          </a:p>
+          <a:p>
+            <a:pPr marL="0" indent="0">
+              <a:buNone/>
+            </a:pPr>
+            <a:r>
+              <a:rPr lang="pt-BR" sz="1200" b="1" dirty="0">
+                <a:solidFill>
+                  <a:srgbClr val="FF0000"/>
+                </a:solidFill>
+                <a:latin typeface="Consolas" panose="020B0609020204030204" pitchFamily="49" charset="0"/>
+              </a:rPr>
+              <a:t>        </a:t>
+            </a:r>
+            <a:r>
+              <a:rPr lang="pt-BR" sz="1200" b="1" dirty="0" err="1">
+                <a:solidFill>
+                  <a:srgbClr val="FF0000"/>
+                </a:solidFill>
+                <a:latin typeface="Consolas" panose="020B0609020204030204" pitchFamily="49" charset="0"/>
+              </a:rPr>
+              <a:t>this.onResetTable</a:t>
+            </a:r>
+            <a:r>
+              <a:rPr lang="pt-BR" sz="1200" b="1" dirty="0">
+                <a:solidFill>
+                  <a:srgbClr val="FF0000"/>
+                </a:solidFill>
+                <a:latin typeface="Consolas" panose="020B0609020204030204" pitchFamily="49" charset="0"/>
+              </a:rPr>
+              <a:t> = </a:t>
+            </a:r>
+            <a:r>
+              <a:rPr lang="pt-BR" sz="1200" b="1" dirty="0" err="1">
+                <a:solidFill>
+                  <a:srgbClr val="FF0000"/>
+                </a:solidFill>
+                <a:latin typeface="Consolas" panose="020B0609020204030204" pitchFamily="49" charset="0"/>
+              </a:rPr>
+              <a:t>this.onResetTable.bind</a:t>
+            </a:r>
+            <a:r>
+              <a:rPr lang="pt-BR" sz="1200" b="1" dirty="0">
+                <a:solidFill>
+                  <a:srgbClr val="FF0000"/>
+                </a:solidFill>
+                <a:latin typeface="Consolas" panose="020B0609020204030204" pitchFamily="49" charset="0"/>
+              </a:rPr>
+              <a:t>(</a:t>
+            </a:r>
+            <a:r>
+              <a:rPr lang="pt-BR" sz="1200" b="1" dirty="0" err="1">
+                <a:solidFill>
+                  <a:srgbClr val="FF0000"/>
+                </a:solidFill>
+                <a:latin typeface="Consolas" panose="020B0609020204030204" pitchFamily="49" charset="0"/>
+              </a:rPr>
+              <a:t>this</a:t>
+            </a:r>
+            <a:r>
+              <a:rPr lang="pt-BR" sz="1200" b="1" dirty="0">
+                <a:solidFill>
+                  <a:srgbClr val="FF0000"/>
+                </a:solidFill>
+                <a:latin typeface="Consolas" panose="020B0609020204030204" pitchFamily="49" charset="0"/>
+              </a:rPr>
+              <a:t>);</a:t>
+            </a:r>
+          </a:p>
+          <a:p>
+            <a:pPr marL="0" lvl="0" indent="0">
+              <a:lnSpc>
+                <a:spcPct val="100000"/>
+              </a:lnSpc>
+              <a:spcBef>
+                <a:spcPts val="0"/>
+              </a:spcBef>
+              <a:buNone/>
+            </a:pPr>
+            <a:endParaRPr lang="pt-BR" sz="1200" b="1" dirty="0">
+              <a:latin typeface="Courier New" panose="02070309020205020404" pitchFamily="49" charset="0"/>
+              <a:cs typeface="Courier New" panose="02070309020205020404" pitchFamily="49" charset="0"/>
+            </a:endParaRPr>
+          </a:p>
+          <a:p>
+            <a:pPr marL="0" indent="0">
+              <a:buNone/>
+            </a:pPr>
+            <a:r>
+              <a:rPr lang="pt-BR" sz="1200" dirty="0">
+                <a:solidFill>
+                  <a:srgbClr val="CCCCCC"/>
+                </a:solidFill>
+                <a:latin typeface="Consolas" panose="020B0609020204030204" pitchFamily="49" charset="0"/>
+              </a:rPr>
+              <a:t>   </a:t>
+            </a:r>
+            <a:endParaRPr lang="pt-BR" sz="1200" dirty="0">
+              <a:latin typeface="Courier New" panose="02070309020205020404" pitchFamily="49" charset="0"/>
+              <a:cs typeface="Courier New" panose="02070309020205020404" pitchFamily="49" charset="0"/>
+            </a:endParaRPr>
+          </a:p>
+        </p:txBody>
+      </p:sp>
+    </p:spTree>
+    <p:extLst>
+      <p:ext uri="{BB962C8B-B14F-4D97-AF65-F5344CB8AC3E}">
+        <p14:creationId xmlns:p14="http://schemas.microsoft.com/office/powerpoint/2010/main" val="1196480943"/>
       </p:ext>
     </p:extLst>
   </p:cSld>

</xml_diff>